<commit_message>
add config brain tumor
</commit_message>
<xml_diff>
--- a/mid_term/mid_term.pptx
+++ b/mid_term/mid_term.pptx
@@ -5777,14 +5777,14 @@
           <p:nvPr>
             <p:extLst>
               <p:ext uri="{D42A27DB-BD31-4B8C-83A1-F6EECF244321}">
-                <p14:modId xmlns:p14="http://schemas.microsoft.com/office/powerpoint/2010/main" val="595068972"/>
+                <p14:modId xmlns:p14="http://schemas.microsoft.com/office/powerpoint/2010/main" val="332918326"/>
               </p:ext>
             </p:extLst>
           </p:nvPr>
         </p:nvGraphicFramePr>
         <p:xfrm>
           <a:off x="2694609" y="3813629"/>
-          <a:ext cx="8127999" cy="2225040"/>
+          <a:ext cx="8127999" cy="2595880"/>
         </p:xfrm>
         <a:graphic>
           <a:graphicData uri="http://schemas.openxmlformats.org/drawingml/2006/table">
@@ -6066,40 +6066,30 @@
                     <a:bodyPr/>
                     <a:lstStyle/>
                     <a:p>
-                      <a:pPr marL="0" marR="0" lvl="0" indent="0" algn="l" defTabSz="914400" rtl="0" eaLnBrk="1" fontAlgn="auto" latinLnBrk="0" hangingPunct="1">
-                        <a:lnSpc>
-                          <a:spcPct val="100000"/>
-                        </a:lnSpc>
-                        <a:spcBef>
-                          <a:spcPts val="0"/>
-                        </a:spcBef>
-                        <a:spcAft>
-                          <a:spcPts val="0"/>
-                        </a:spcAft>
-                        <a:buClrTx/>
-                        <a:buSzTx/>
-                        <a:buFontTx/>
-                        <a:buNone/>
-                        <a:tabLst/>
-                        <a:defRPr/>
-                      </a:pPr>
-                      <a:endParaRPr lang="en-US" sz="1800" b="0" i="0" u="none" strike="noStrike" dirty="0">
-                        <a:solidFill>
-                          <a:srgbClr val="000000"/>
-                        </a:solidFill>
-                        <a:effectLst/>
-                        <a:latin typeface="Calibri" panose="020F0502020204030204" pitchFamily="34" charset="0"/>
-                      </a:endParaRPr>
+                      <a:pPr algn="l" rtl="0" fontAlgn="ctr"/>
+                      <a:r>
+                        <a:rPr lang="en-US" sz="1800" b="0" i="0" u="none" strike="noStrike" dirty="0">
+                          <a:solidFill>
+                            <a:srgbClr val="000000"/>
+                          </a:solidFill>
+                          <a:effectLst/>
+                          <a:latin typeface="Calibri" panose="020F0502020204030204" pitchFamily="34" charset="0"/>
+                        </a:rPr>
+                        <a:t>134,301,514</a:t>
+                      </a:r>
                     </a:p>
                   </a:txBody>
-                  <a:tcPr/>
+                  <a:tcPr marL="9525" marR="9525" marT="9525" marB="0" anchor="ctr"/>
                 </a:tc>
                 <a:tc>
                   <a:txBody>
                     <a:bodyPr/>
                     <a:lstStyle/>
                     <a:p>
-                      <a:endParaRPr lang="en-US" dirty="0"/>
+                      <a:r>
+                        <a:rPr lang="en-US" b="1" dirty="0"/>
+                        <a:t>0.88</a:t>
+                      </a:r>
                     </a:p>
                   </a:txBody>
                   <a:tcPr/>
@@ -6118,7 +6108,7 @@
                     <a:p>
                       <a:r>
                         <a:rPr lang="en-US" dirty="0"/>
-                        <a:t>Resnet34-pretrained</a:t>
+                        <a:t>Resnet50-pretrained</a:t>
                       </a:r>
                     </a:p>
                   </a:txBody>
@@ -6138,7 +6128,7 @@
                           <a:effectLst/>
                           <a:latin typeface="Calibri" panose="020F0502020204030204" pitchFamily="34" charset="0"/>
                         </a:rPr>
-                        <a:t>21,289,802</a:t>
+                        <a:t>25,567,042</a:t>
                       </a:r>
                     </a:p>
                   </a:txBody>
@@ -6149,14 +6139,70 @@
                     <a:bodyPr/>
                     <a:lstStyle/>
                     <a:p>
-                      <a:endParaRPr lang="en-US" dirty="0"/>
+                      <a:r>
+                        <a:rPr lang="en-US" dirty="0"/>
+                        <a:t>0.85</a:t>
+                      </a:r>
                     </a:p>
                   </a:txBody>
                   <a:tcPr/>
                 </a:tc>
                 <a:extLst>
                   <a:ext uri="{0D108BD9-81ED-4DB2-BD59-A6C34878D82A}">
-                    <a16:rowId xmlns:a16="http://schemas.microsoft.com/office/drawing/2014/main" val="3645663653"/>
+                    <a16:rowId xmlns:a16="http://schemas.microsoft.com/office/drawing/2014/main" val="2210897157"/>
+                  </a:ext>
+                </a:extLst>
+              </a:tr>
+              <a:tr h="370840">
+                <a:tc>
+                  <a:txBody>
+                    <a:bodyPr/>
+                    <a:lstStyle/>
+                    <a:p>
+                      <a:r>
+                        <a:rPr lang="en-US" dirty="0"/>
+                        <a:t>Densenet121-pretrained</a:t>
+                      </a:r>
+                    </a:p>
+                  </a:txBody>
+                  <a:tcPr/>
+                </a:tc>
+                <a:tc>
+                  <a:txBody>
+                    <a:bodyPr/>
+                    <a:lstStyle/>
+                    <a:p>
+                      <a:pPr algn="l" rtl="0" fontAlgn="ctr"/>
+                      <a:r>
+                        <a:rPr lang="en-US" sz="1800" b="0" i="0" u="none" strike="noStrike" dirty="0">
+                          <a:solidFill>
+                            <a:srgbClr val="000000"/>
+                          </a:solidFill>
+                          <a:effectLst/>
+                          <a:latin typeface="Calibri" panose="020F0502020204030204" pitchFamily="34" charset="0"/>
+                        </a:rPr>
+                        <a:t>6,964,106</a:t>
+                      </a:r>
+                    </a:p>
+                  </a:txBody>
+                  <a:tcPr marL="9525" marR="9525" marT="9525" marB="0" anchor="ctr"/>
+                </a:tc>
+                <a:tc>
+                  <a:txBody>
+                    <a:bodyPr/>
+                    <a:lstStyle/>
+                    <a:p>
+                      <a:r>
+                        <a:rPr lang="en-US" dirty="0"/>
+                        <a:t>0.82</a:t>
+                      </a:r>
+                    </a:p>
+                  </a:txBody>
+                  <a:tcPr/>
+                </a:tc>
+                <a:extLst>
+                  <a:ext uri="{0D108BD9-81ED-4DB2-BD59-A6C34878D82A}">
+                    <a16:rowId xmlns:a16="http://schemas.microsoft.com/office/drawing/2014/main" val="1415138621"/>
                   </a:ext>
                 </a:extLst>
               </a:tr>
@@ -6179,7 +6225,7 @@
           <p:nvPr>
             <p:extLst>
               <p:ext uri="{D42A27DB-BD31-4B8C-83A1-F6EECF244321}">
-                <p14:modId xmlns:p14="http://schemas.microsoft.com/office/powerpoint/2010/main" val="3753113342"/>
+                <p14:modId xmlns:p14="http://schemas.microsoft.com/office/powerpoint/2010/main" val="1255443537"/>
               </p:ext>
             </p:extLst>
           </p:nvPr>
@@ -6222,7 +6268,7 @@
                       </a:pPr>
                       <a:r>
                         <a:rPr lang="vi-VN" dirty="0"/>
-                        <a:t>Dataset: 10 </a:t>
+                        <a:t>Dataset:</a:t>
                       </a:r>
                     </a:p>
                   </a:txBody>
@@ -6237,7 +6283,10 @@
                         <a:rPr lang="vi-VN" dirty="0"/>
                         <a:t>Cifar</a:t>
                       </a:r>
-                      <a:endParaRPr lang="en-US" dirty="0"/>
+                      <a:r>
+                        <a:rPr lang="en-US" dirty="0"/>
+                        <a:t>10</a:t>
+                      </a:r>
                     </a:p>
                   </a:txBody>
                   <a:tcPr/>
@@ -6443,6 +6492,7 @@
               <a:rPr lang="vi-VN" dirty="0"/>
               <a:t>Optimizer</a:t>
             </a:r>
+            <a:endParaRPr lang="en-US" dirty="0"/>
           </a:p>
           <a:p>
             <a:pPr>
@@ -6451,7 +6501,7 @@
             </a:pPr>
             <a:r>
               <a:rPr lang="en-US" dirty="0"/>
-              <a:t>SGD</a:t>
+              <a:t>Config:</a:t>
             </a:r>
           </a:p>
           <a:p>
@@ -6460,6 +6510,12 @@
               <a:buChar char="-"/>
             </a:pPr>
             <a:endParaRPr lang="en-US" dirty="0"/>
+          </a:p>
+          <a:p>
+            <a:pPr marL="0" indent="0">
+              <a:buNone/>
+            </a:pPr>
+            <a:endParaRPr lang="vi-VN" dirty="0"/>
           </a:p>
         </p:txBody>
       </p:sp>
@@ -6492,6 +6548,1766 @@
           </a:p>
         </p:txBody>
       </p:sp>
+      <mc:AlternateContent xmlns:mc="http://schemas.openxmlformats.org/markup-compatibility/2006">
+        <mc:Choice xmlns:a14="http://schemas.microsoft.com/office/drawing/2010/main" Requires="a14">
+          <p:graphicFrame>
+            <p:nvGraphicFramePr>
+              <p:cNvPr id="6" name="Table 6">
+                <a:extLst>
+                  <a:ext uri="{FF2B5EF4-FFF2-40B4-BE49-F238E27FC236}">
+                    <a16:creationId xmlns:a16="http://schemas.microsoft.com/office/drawing/2014/main" id="{A3CB9A89-6C9B-43FB-9BF1-E465A84F76E7}"/>
+                  </a:ext>
+                </a:extLst>
+              </p:cNvPr>
+              <p:cNvGraphicFramePr>
+                <a:graphicFrameLocks noGrp="1"/>
+              </p:cNvGraphicFramePr>
+              <p:nvPr>
+                <p:extLst>
+                  <p:ext uri="{D42A27DB-BD31-4B8C-83A1-F6EECF244321}">
+                    <p14:modId xmlns:p14="http://schemas.microsoft.com/office/powerpoint/2010/main" val="3393461101"/>
+                  </p:ext>
+                </p:extLst>
+              </p:nvPr>
+            </p:nvGraphicFramePr>
+            <p:xfrm>
+              <a:off x="659295" y="2186606"/>
+              <a:ext cx="10515599" cy="4124555"/>
+            </p:xfrm>
+            <a:graphic>
+              <a:graphicData uri="http://schemas.openxmlformats.org/drawingml/2006/table">
+                <a:tbl>
+                  <a:tblPr firstCol="1" bandRow="1">
+                    <a:tableStyleId>{5C22544A-7EE6-4342-B048-85BDC9FD1C3A}</a:tableStyleId>
+                  </a:tblPr>
+                  <a:tblGrid>
+                    <a:gridCol w="2217183">
+                      <a:extLst>
+                        <a:ext uri="{9D8B030D-6E8A-4147-A177-3AD203B41FA5}">
+                          <a16:colId xmlns:a16="http://schemas.microsoft.com/office/drawing/2014/main" val="3260499319"/>
+                        </a:ext>
+                      </a:extLst>
+                    </a:gridCol>
+                    <a:gridCol w="4650757">
+                      <a:extLst>
+                        <a:ext uri="{9D8B030D-6E8A-4147-A177-3AD203B41FA5}">
+                          <a16:colId xmlns:a16="http://schemas.microsoft.com/office/drawing/2014/main" val="1498540713"/>
+                        </a:ext>
+                      </a:extLst>
+                    </a:gridCol>
+                    <a:gridCol w="3647659">
+                      <a:extLst>
+                        <a:ext uri="{9D8B030D-6E8A-4147-A177-3AD203B41FA5}">
+                          <a16:colId xmlns:a16="http://schemas.microsoft.com/office/drawing/2014/main" val="2916445189"/>
+                        </a:ext>
+                      </a:extLst>
+                    </a:gridCol>
+                  </a:tblGrid>
+                  <a:tr h="951690">
+                    <a:tc>
+                      <a:txBody>
+                        <a:bodyPr/>
+                        <a:lstStyle/>
+                        <a:p>
+                          <a:r>
+                            <a:rPr lang="en-US" dirty="0"/>
+                            <a:t>Optimizer</a:t>
+                          </a:r>
+                        </a:p>
+                      </a:txBody>
+                      <a:tcPr/>
+                    </a:tc>
+                    <a:tc>
+                      <a:txBody>
+                        <a:bodyPr/>
+                        <a:lstStyle/>
+                        <a:p>
+                          <a:r>
+                            <a:rPr lang="en-US" dirty="0"/>
+                            <a:t>Description</a:t>
+                          </a:r>
+                        </a:p>
+                      </a:txBody>
+                      <a:tcPr/>
+                    </a:tc>
+                    <a:tc>
+                      <a:txBody>
+                        <a:bodyPr/>
+                        <a:lstStyle/>
+                        <a:p>
+                          <a:r>
+                            <a:rPr lang="en-US" dirty="0"/>
+                            <a:t>Result</a:t>
+                          </a:r>
+                        </a:p>
+                        <a:p>
+                          <a:pPr marL="285750" indent="-285750">
+                            <a:buFontTx/>
+                            <a:buChar char="-"/>
+                          </a:pPr>
+                          <a:r>
+                            <a:rPr lang="en-US" dirty="0" err="1"/>
+                            <a:t>MenWomanDataset</a:t>
+                          </a:r>
+                          <a:endParaRPr lang="en-US" dirty="0"/>
+                        </a:p>
+                        <a:p>
+                          <a:pPr marL="285750" indent="-285750">
+                            <a:buFontTx/>
+                            <a:buChar char="-"/>
+                          </a:pPr>
+                          <a:r>
+                            <a:rPr lang="en-US" dirty="0"/>
+                            <a:t>Dense121</a:t>
+                          </a:r>
+                        </a:p>
+                      </a:txBody>
+                      <a:tcPr/>
+                    </a:tc>
+                    <a:extLst>
+                      <a:ext uri="{0D108BD9-81ED-4DB2-BD59-A6C34878D82A}">
+                        <a16:rowId xmlns:a16="http://schemas.microsoft.com/office/drawing/2014/main" val="1504969892"/>
+                      </a:ext>
+                    </a:extLst>
+                  </a:tr>
+                  <a:tr h="612069">
+                    <a:tc>
+                      <a:txBody>
+                        <a:bodyPr/>
+                        <a:lstStyle/>
+                        <a:p>
+                          <a:r>
+                            <a:rPr lang="en-US" dirty="0"/>
+                            <a:t>SGD</a:t>
+                          </a:r>
+                        </a:p>
+                      </a:txBody>
+                      <a:tcPr/>
+                    </a:tc>
+                    <a:tc>
+                      <a:txBody>
+                        <a:bodyPr/>
+                        <a:lstStyle/>
+                        <a:p>
+                          <a:pPr marL="285750" indent="-285750">
+                            <a:buFont typeface="Arial" panose="020B0604020202020204" pitchFamily="34" charset="0"/>
+                            <a:buChar char="•"/>
+                          </a:pPr>
+                          <a14:m>
+                            <m:oMath xmlns:m="http://schemas.openxmlformats.org/officeDocument/2006/math">
+                              <m:sSub>
+                                <m:sSubPr>
+                                  <m:ctrlPr>
+                                    <a:rPr lang="en-US" b="0" i="1" smtClean="0">
+                                      <a:latin typeface="Cambria Math" panose="02040503050406030204" pitchFamily="18" charset="0"/>
+                                    </a:rPr>
+                                  </m:ctrlPr>
+                                </m:sSubPr>
+                                <m:e>
+                                  <m:r>
+                                    <a:rPr lang="en-US" b="0" i="1" smtClean="0">
+                                      <a:latin typeface="Cambria Math" panose="02040503050406030204" pitchFamily="18" charset="0"/>
+                                    </a:rPr>
+                                    <m:t>𝑊</m:t>
+                                  </m:r>
+                                </m:e>
+                                <m:sub>
+                                  <m:r>
+                                    <a:rPr lang="en-US" b="0" i="1" smtClean="0">
+                                      <a:latin typeface="Cambria Math" panose="02040503050406030204" pitchFamily="18" charset="0"/>
+                                    </a:rPr>
+                                    <m:t>𝑡</m:t>
+                                  </m:r>
+                                  <m:r>
+                                    <a:rPr lang="en-US" b="0" i="1" smtClean="0">
+                                      <a:latin typeface="Cambria Math" panose="02040503050406030204" pitchFamily="18" charset="0"/>
+                                    </a:rPr>
+                                    <m:t>+1</m:t>
+                                  </m:r>
+                                </m:sub>
+                              </m:sSub>
+                              <m:r>
+                                <a:rPr lang="en-US" b="0" i="1" smtClean="0">
+                                  <a:latin typeface="Cambria Math" panose="02040503050406030204" pitchFamily="18" charset="0"/>
+                                </a:rPr>
+                                <m:t>=</m:t>
+                              </m:r>
+                              <m:sSub>
+                                <m:sSubPr>
+                                  <m:ctrlPr>
+                                    <a:rPr lang="en-US" b="0" i="1" smtClean="0">
+                                      <a:latin typeface="Cambria Math" panose="02040503050406030204" pitchFamily="18" charset="0"/>
+                                    </a:rPr>
+                                  </m:ctrlPr>
+                                </m:sSubPr>
+                                <m:e>
+                                  <m:r>
+                                    <a:rPr lang="en-US" b="0" i="1" smtClean="0">
+                                      <a:latin typeface="Cambria Math" panose="02040503050406030204" pitchFamily="18" charset="0"/>
+                                    </a:rPr>
+                                    <m:t>𝑊</m:t>
+                                  </m:r>
+                                </m:e>
+                                <m:sub>
+                                  <m:r>
+                                    <a:rPr lang="en-US" b="0" i="1" smtClean="0">
+                                      <a:latin typeface="Cambria Math" panose="02040503050406030204" pitchFamily="18" charset="0"/>
+                                    </a:rPr>
+                                    <m:t>𝑡</m:t>
+                                  </m:r>
+                                </m:sub>
+                              </m:sSub>
+                              <m:r>
+                                <a:rPr lang="en-US" b="0" i="1" smtClean="0">
+                                  <a:latin typeface="Cambria Math" panose="02040503050406030204" pitchFamily="18" charset="0"/>
+                                </a:rPr>
+                                <m:t>−</m:t>
+                              </m:r>
+                              <m:r>
+                                <a:rPr lang="en-US" b="0" i="1" smtClean="0">
+                                  <a:latin typeface="Cambria Math" panose="02040503050406030204" pitchFamily="18" charset="0"/>
+                                </a:rPr>
+                                <m:t>𝑙𝑟</m:t>
+                              </m:r>
+                              <m:r>
+                                <a:rPr lang="en-US" b="0" i="1" smtClean="0">
+                                  <a:latin typeface="Cambria Math" panose="02040503050406030204" pitchFamily="18" charset="0"/>
+                                </a:rPr>
+                                <m:t>∗</m:t>
+                              </m:r>
+                              <m:r>
+                                <a:rPr lang="en-US" b="0" i="1" smtClean="0">
+                                  <a:latin typeface="Cambria Math" panose="02040503050406030204" pitchFamily="18" charset="0"/>
+                                </a:rPr>
+                                <m:t>𝑑𝑊</m:t>
+                              </m:r>
+                            </m:oMath>
+                          </a14:m>
+                          <a:endParaRPr lang="en-US" dirty="0"/>
+                        </a:p>
+                      </a:txBody>
+                      <a:tcPr/>
+                    </a:tc>
+                    <a:tc>
+                      <a:txBody>
+                        <a:bodyPr/>
+                        <a:lstStyle/>
+                        <a:p>
+                          <a:endParaRPr lang="en-US" dirty="0"/>
+                        </a:p>
+                      </a:txBody>
+                      <a:tcPr/>
+                    </a:tc>
+                    <a:extLst>
+                      <a:ext uri="{0D108BD9-81ED-4DB2-BD59-A6C34878D82A}">
+                        <a16:rowId xmlns:a16="http://schemas.microsoft.com/office/drawing/2014/main" val="3351530658"/>
+                      </a:ext>
+                    </a:extLst>
+                  </a:tr>
+                  <a:tr h="653256">
+                    <a:tc>
+                      <a:txBody>
+                        <a:bodyPr/>
+                        <a:lstStyle/>
+                        <a:p>
+                          <a:r>
+                            <a:rPr lang="en-US" dirty="0"/>
+                            <a:t>SGD Momentum</a:t>
+                          </a:r>
+                        </a:p>
+                      </a:txBody>
+                      <a:tcPr/>
+                    </a:tc>
+                    <a:tc>
+                      <a:txBody>
+                        <a:bodyPr/>
+                        <a:lstStyle/>
+                        <a:p>
+                          <a:pPr marL="285750" marR="0" lvl="0" indent="-285750" algn="dist" defTabSz="914400" rtl="0" eaLnBrk="1" fontAlgn="auto" latinLnBrk="0" hangingPunct="1">
+                            <a:lnSpc>
+                              <a:spcPct val="100000"/>
+                            </a:lnSpc>
+                            <a:spcBef>
+                              <a:spcPts val="0"/>
+                            </a:spcBef>
+                            <a:spcAft>
+                              <a:spcPts val="0"/>
+                            </a:spcAft>
+                            <a:buClrTx/>
+                            <a:buSzTx/>
+                            <a:buFont typeface="Arial" panose="020B0604020202020204" pitchFamily="34" charset="0"/>
+                            <a:buChar char="•"/>
+                            <a:tabLst/>
+                            <a:defRPr/>
+                          </a:pPr>
+                          <a14:m>
+                            <m:oMath xmlns:m="http://schemas.openxmlformats.org/officeDocument/2006/math">
+                              <m:sSub>
+                                <m:sSubPr>
+                                  <m:ctrlPr>
+                                    <a:rPr lang="en-US" b="0" i="1" smtClean="0">
+                                      <a:latin typeface="Cambria Math" panose="02040503050406030204" pitchFamily="18" charset="0"/>
+                                    </a:rPr>
+                                  </m:ctrlPr>
+                                </m:sSubPr>
+                                <m:e>
+                                  <m:r>
+                                    <a:rPr lang="en-US" b="0" i="1" smtClean="0">
+                                      <a:latin typeface="Cambria Math" panose="02040503050406030204" pitchFamily="18" charset="0"/>
+                                    </a:rPr>
+                                    <m:t>𝑉</m:t>
+                                  </m:r>
+                                </m:e>
+                                <m:sub>
+                                  <m:r>
+                                    <a:rPr lang="en-US" b="0" i="1" smtClean="0">
+                                      <a:latin typeface="Cambria Math" panose="02040503050406030204" pitchFamily="18" charset="0"/>
+                                    </a:rPr>
+                                    <m:t>𝑡</m:t>
+                                  </m:r>
+                                  <m:r>
+                                    <a:rPr lang="en-US" b="0" i="1" smtClean="0">
+                                      <a:latin typeface="Cambria Math" panose="02040503050406030204" pitchFamily="18" charset="0"/>
+                                    </a:rPr>
+                                    <m:t>+1</m:t>
+                                  </m:r>
+                                </m:sub>
+                              </m:sSub>
+                              <m:r>
+                                <a:rPr lang="en-US" b="0" i="1" dirty="0" smtClean="0">
+                                  <a:latin typeface="Cambria Math" panose="02040503050406030204" pitchFamily="18" charset="0"/>
+                                </a:rPr>
+                                <m:t>=</m:t>
+                              </m:r>
+                              <m:r>
+                                <a:rPr lang="en-US" b="0" i="1" dirty="0" smtClean="0">
+                                  <a:latin typeface="Cambria Math" panose="02040503050406030204" pitchFamily="18" charset="0"/>
+                                  <a:ea typeface="Cambria Math" panose="02040503050406030204" pitchFamily="18" charset="0"/>
+                                </a:rPr>
+                                <m:t>𝛽</m:t>
+                              </m:r>
+                              <m:r>
+                                <a:rPr lang="en-US" b="0" i="1" dirty="0" smtClean="0">
+                                  <a:latin typeface="Cambria Math" panose="02040503050406030204" pitchFamily="18" charset="0"/>
+                                  <a:ea typeface="Cambria Math" panose="02040503050406030204" pitchFamily="18" charset="0"/>
+                                </a:rPr>
+                                <m:t>∗</m:t>
+                              </m:r>
+                              <m:sSub>
+                                <m:sSubPr>
+                                  <m:ctrlPr>
+                                    <a:rPr lang="en-US" b="0" i="1" dirty="0" err="1" smtClean="0">
+                                      <a:latin typeface="Cambria Math" panose="02040503050406030204" pitchFamily="18" charset="0"/>
+                                    </a:rPr>
+                                  </m:ctrlPr>
+                                </m:sSubPr>
+                                <m:e>
+                                  <m:r>
+                                    <a:rPr lang="en-US" b="0" i="1" dirty="0" smtClean="0">
+                                      <a:latin typeface="Cambria Math" panose="02040503050406030204" pitchFamily="18" charset="0"/>
+                                    </a:rPr>
+                                    <m:t>𝑉</m:t>
+                                  </m:r>
+                                </m:e>
+                                <m:sub>
+                                  <m:r>
+                                    <a:rPr lang="en-US" b="0" i="1" dirty="0" err="1" smtClean="0">
+                                      <a:latin typeface="Cambria Math" panose="02040503050406030204" pitchFamily="18" charset="0"/>
+                                    </a:rPr>
+                                    <m:t>𝑡</m:t>
+                                  </m:r>
+                                </m:sub>
+                              </m:sSub>
+                              <m:r>
+                                <a:rPr lang="en-US" b="0" i="1" dirty="0" smtClean="0">
+                                  <a:latin typeface="Cambria Math" panose="02040503050406030204" pitchFamily="18" charset="0"/>
+                                </a:rPr>
+                                <m:t>+(1−</m:t>
+                              </m:r>
+                              <m:r>
+                                <a:rPr lang="en-US" b="0" i="1" dirty="0" smtClean="0">
+                                  <a:latin typeface="Cambria Math" panose="02040503050406030204" pitchFamily="18" charset="0"/>
+                                  <a:ea typeface="Cambria Math" panose="02040503050406030204" pitchFamily="18" charset="0"/>
+                                </a:rPr>
+                                <m:t>𝛽</m:t>
+                              </m:r>
+                              <m:r>
+                                <a:rPr lang="en-US" b="0" i="1" dirty="0" smtClean="0">
+                                  <a:latin typeface="Cambria Math" panose="02040503050406030204" pitchFamily="18" charset="0"/>
+                                  <a:ea typeface="Cambria Math" panose="02040503050406030204" pitchFamily="18" charset="0"/>
+                                </a:rPr>
+                                <m:t>)∗</m:t>
+                              </m:r>
+                              <m:r>
+                                <a:rPr lang="en-US" b="0" i="1" dirty="0" err="1" smtClean="0">
+                                  <a:latin typeface="Cambria Math" panose="02040503050406030204" pitchFamily="18" charset="0"/>
+                                </a:rPr>
+                                <m:t>𝑑𝑊</m:t>
+                              </m:r>
+                            </m:oMath>
+                          </a14:m>
+                          <a:endParaRPr lang="en-US" dirty="0"/>
+                        </a:p>
+                        <a:p>
+                          <a:pPr marL="285750" marR="0" lvl="0" indent="-285750" algn="dist" defTabSz="914400" rtl="0" eaLnBrk="1" fontAlgn="auto" latinLnBrk="0" hangingPunct="1">
+                            <a:lnSpc>
+                              <a:spcPct val="100000"/>
+                            </a:lnSpc>
+                            <a:spcBef>
+                              <a:spcPts val="0"/>
+                            </a:spcBef>
+                            <a:spcAft>
+                              <a:spcPts val="0"/>
+                            </a:spcAft>
+                            <a:buClrTx/>
+                            <a:buSzTx/>
+                            <a:buFont typeface="Arial" panose="020B0604020202020204" pitchFamily="34" charset="0"/>
+                            <a:buChar char="•"/>
+                            <a:tabLst/>
+                            <a:defRPr/>
+                          </a:pPr>
+                          <a14:m>
+                            <m:oMath xmlns:m="http://schemas.openxmlformats.org/officeDocument/2006/math">
+                              <m:sSub>
+                                <m:sSubPr>
+                                  <m:ctrlPr>
+                                    <a:rPr lang="en-US" b="0" i="1" smtClean="0">
+                                      <a:latin typeface="Cambria Math" panose="02040503050406030204" pitchFamily="18" charset="0"/>
+                                    </a:rPr>
+                                  </m:ctrlPr>
+                                </m:sSubPr>
+                                <m:e>
+                                  <m:r>
+                                    <a:rPr lang="en-US" b="0" i="1" smtClean="0">
+                                      <a:latin typeface="Cambria Math" panose="02040503050406030204" pitchFamily="18" charset="0"/>
+                                    </a:rPr>
+                                    <m:t>𝑊</m:t>
+                                  </m:r>
+                                </m:e>
+                                <m:sub>
+                                  <m:r>
+                                    <a:rPr lang="en-US" b="0" i="1" smtClean="0">
+                                      <a:latin typeface="Cambria Math" panose="02040503050406030204" pitchFamily="18" charset="0"/>
+                                    </a:rPr>
+                                    <m:t>𝑡</m:t>
+                                  </m:r>
+                                  <m:r>
+                                    <a:rPr lang="en-US" b="0" i="1" smtClean="0">
+                                      <a:latin typeface="Cambria Math" panose="02040503050406030204" pitchFamily="18" charset="0"/>
+                                    </a:rPr>
+                                    <m:t>+1</m:t>
+                                  </m:r>
+                                </m:sub>
+                              </m:sSub>
+                              <m:r>
+                                <a:rPr lang="en-US" b="0" i="1" smtClean="0">
+                                  <a:latin typeface="Cambria Math" panose="02040503050406030204" pitchFamily="18" charset="0"/>
+                                </a:rPr>
+                                <m:t>=</m:t>
+                              </m:r>
+                              <m:sSub>
+                                <m:sSubPr>
+                                  <m:ctrlPr>
+                                    <a:rPr lang="en-US" b="0" i="1" smtClean="0">
+                                      <a:latin typeface="Cambria Math" panose="02040503050406030204" pitchFamily="18" charset="0"/>
+                                    </a:rPr>
+                                  </m:ctrlPr>
+                                </m:sSubPr>
+                                <m:e>
+                                  <m:r>
+                                    <a:rPr lang="en-US" b="0" i="1" smtClean="0">
+                                      <a:latin typeface="Cambria Math" panose="02040503050406030204" pitchFamily="18" charset="0"/>
+                                    </a:rPr>
+                                    <m:t>𝑊</m:t>
+                                  </m:r>
+                                </m:e>
+                                <m:sub>
+                                  <m:r>
+                                    <a:rPr lang="en-US" b="0" i="1" smtClean="0">
+                                      <a:latin typeface="Cambria Math" panose="02040503050406030204" pitchFamily="18" charset="0"/>
+                                    </a:rPr>
+                                    <m:t>𝑡</m:t>
+                                  </m:r>
+                                </m:sub>
+                              </m:sSub>
+                              <m:r>
+                                <a:rPr lang="en-US" b="0" i="1" smtClean="0">
+                                  <a:latin typeface="Cambria Math" panose="02040503050406030204" pitchFamily="18" charset="0"/>
+                                </a:rPr>
+                                <m:t>−</m:t>
+                              </m:r>
+                              <m:r>
+                                <a:rPr lang="en-US" b="0" i="1" smtClean="0">
+                                  <a:latin typeface="Cambria Math" panose="02040503050406030204" pitchFamily="18" charset="0"/>
+                                  <a:ea typeface="Cambria Math" panose="02040503050406030204" pitchFamily="18" charset="0"/>
+                                </a:rPr>
+                                <m:t>𝛼</m:t>
+                              </m:r>
+                              <m:r>
+                                <a:rPr lang="en-US" b="0" i="1" smtClean="0">
+                                  <a:latin typeface="Cambria Math" panose="02040503050406030204" pitchFamily="18" charset="0"/>
+                                </a:rPr>
+                                <m:t>∗</m:t>
+                              </m:r>
+                              <m:sSub>
+                                <m:sSubPr>
+                                  <m:ctrlPr>
+                                    <a:rPr lang="en-US" b="0" i="1" smtClean="0">
+                                      <a:latin typeface="Cambria Math" panose="02040503050406030204" pitchFamily="18" charset="0"/>
+                                    </a:rPr>
+                                  </m:ctrlPr>
+                                </m:sSubPr>
+                                <m:e>
+                                  <m:r>
+                                    <a:rPr lang="en-US" b="0" i="1" smtClean="0">
+                                      <a:latin typeface="Cambria Math" panose="02040503050406030204" pitchFamily="18" charset="0"/>
+                                    </a:rPr>
+                                    <m:t>𝑉</m:t>
+                                  </m:r>
+                                </m:e>
+                                <m:sub>
+                                  <m:r>
+                                    <a:rPr lang="en-US" b="0" i="1" smtClean="0">
+                                      <a:latin typeface="Cambria Math" panose="02040503050406030204" pitchFamily="18" charset="0"/>
+                                    </a:rPr>
+                                    <m:t>𝑡</m:t>
+                                  </m:r>
+                                  <m:r>
+                                    <a:rPr lang="en-US" b="0" i="1" smtClean="0">
+                                      <a:latin typeface="Cambria Math" panose="02040503050406030204" pitchFamily="18" charset="0"/>
+                                    </a:rPr>
+                                    <m:t>+1</m:t>
+                                  </m:r>
+                                </m:sub>
+                              </m:sSub>
+                            </m:oMath>
+                          </a14:m>
+                          <a:endParaRPr lang="en-US" dirty="0"/>
+                        </a:p>
+                      </a:txBody>
+                      <a:tcPr/>
+                    </a:tc>
+                    <a:tc>
+                      <a:txBody>
+                        <a:bodyPr/>
+                        <a:lstStyle/>
+                        <a:p>
+                          <a:endParaRPr lang="en-US" dirty="0"/>
+                        </a:p>
+                      </a:txBody>
+                      <a:tcPr/>
+                    </a:tc>
+                    <a:extLst>
+                      <a:ext uri="{0D108BD9-81ED-4DB2-BD59-A6C34878D82A}">
+                        <a16:rowId xmlns:a16="http://schemas.microsoft.com/office/drawing/2014/main" val="2401624614"/>
+                      </a:ext>
+                    </a:extLst>
+                  </a:tr>
+                  <a:tr h="510726">
+                    <a:tc>
+                      <a:txBody>
+                        <a:bodyPr/>
+                        <a:lstStyle/>
+                        <a:p>
+                          <a:r>
+                            <a:rPr lang="en-US" dirty="0" err="1"/>
+                            <a:t>RMSProp</a:t>
+                          </a:r>
+                          <a:endParaRPr lang="en-US" dirty="0"/>
+                        </a:p>
+                      </a:txBody>
+                      <a:tcPr/>
+                    </a:tc>
+                    <a:tc>
+                      <a:txBody>
+                        <a:bodyPr/>
+                        <a:lstStyle/>
+                        <a:p>
+                          <a:pPr marL="285750" marR="0" lvl="0" indent="-285750" algn="dist" defTabSz="914400" rtl="0" eaLnBrk="1" fontAlgn="auto" latinLnBrk="0" hangingPunct="1">
+                            <a:lnSpc>
+                              <a:spcPct val="100000"/>
+                            </a:lnSpc>
+                            <a:spcBef>
+                              <a:spcPts val="0"/>
+                            </a:spcBef>
+                            <a:spcAft>
+                              <a:spcPts val="0"/>
+                            </a:spcAft>
+                            <a:buClrTx/>
+                            <a:buSzTx/>
+                            <a:buFont typeface="Arial" panose="020B0604020202020204" pitchFamily="34" charset="0"/>
+                            <a:buChar char="•"/>
+                            <a:tabLst/>
+                            <a:defRPr/>
+                          </a:pPr>
+                          <a14:m>
+                            <m:oMath xmlns:m="http://schemas.openxmlformats.org/officeDocument/2006/math">
+                              <m:sSub>
+                                <m:sSubPr>
+                                  <m:ctrlPr>
+                                    <a:rPr lang="en-US" b="0" i="1" smtClean="0">
+                                      <a:latin typeface="Cambria Math" panose="02040503050406030204" pitchFamily="18" charset="0"/>
+                                    </a:rPr>
+                                  </m:ctrlPr>
+                                </m:sSubPr>
+                                <m:e>
+                                  <m:r>
+                                    <a:rPr lang="en-US" b="0" i="1" smtClean="0">
+                                      <a:latin typeface="Cambria Math" panose="02040503050406030204" pitchFamily="18" charset="0"/>
+                                    </a:rPr>
+                                    <m:t>𝑆</m:t>
+                                  </m:r>
+                                </m:e>
+                                <m:sub>
+                                  <m:r>
+                                    <a:rPr lang="en-US" b="0" i="1" smtClean="0">
+                                      <a:latin typeface="Cambria Math" panose="02040503050406030204" pitchFamily="18" charset="0"/>
+                                    </a:rPr>
+                                    <m:t>𝑡</m:t>
+                                  </m:r>
+                                  <m:r>
+                                    <a:rPr lang="en-US" b="0" i="1" smtClean="0">
+                                      <a:latin typeface="Cambria Math" panose="02040503050406030204" pitchFamily="18" charset="0"/>
+                                    </a:rPr>
+                                    <m:t>+1</m:t>
+                                  </m:r>
+                                </m:sub>
+                              </m:sSub>
+                              <m:r>
+                                <a:rPr lang="en-US" b="0" i="1" dirty="0" smtClean="0">
+                                  <a:latin typeface="Cambria Math" panose="02040503050406030204" pitchFamily="18" charset="0"/>
+                                </a:rPr>
+                                <m:t>=</m:t>
+                              </m:r>
+                              <m:r>
+                                <a:rPr lang="en-US" b="0" i="1" dirty="0" smtClean="0">
+                                  <a:latin typeface="Cambria Math" panose="02040503050406030204" pitchFamily="18" charset="0"/>
+                                  <a:ea typeface="Cambria Math" panose="02040503050406030204" pitchFamily="18" charset="0"/>
+                                </a:rPr>
+                                <m:t>𝛾</m:t>
+                              </m:r>
+                              <m:r>
+                                <a:rPr lang="en-US" b="0" i="1" dirty="0" smtClean="0">
+                                  <a:latin typeface="Cambria Math" panose="02040503050406030204" pitchFamily="18" charset="0"/>
+                                  <a:ea typeface="Cambria Math" panose="02040503050406030204" pitchFamily="18" charset="0"/>
+                                </a:rPr>
+                                <m:t>∗</m:t>
+                              </m:r>
+                              <m:sSub>
+                                <m:sSubPr>
+                                  <m:ctrlPr>
+                                    <a:rPr lang="en-US" b="0" i="1" dirty="0" err="1" smtClean="0">
+                                      <a:latin typeface="Cambria Math" panose="02040503050406030204" pitchFamily="18" charset="0"/>
+                                    </a:rPr>
+                                  </m:ctrlPr>
+                                </m:sSubPr>
+                                <m:e>
+                                  <m:r>
+                                    <a:rPr lang="en-US" b="0" i="1" dirty="0" smtClean="0">
+                                      <a:latin typeface="Cambria Math" panose="02040503050406030204" pitchFamily="18" charset="0"/>
+                                    </a:rPr>
+                                    <m:t>𝑆</m:t>
+                                  </m:r>
+                                </m:e>
+                                <m:sub>
+                                  <m:r>
+                                    <a:rPr lang="en-US" b="0" i="1" dirty="0" err="1" smtClean="0">
+                                      <a:latin typeface="Cambria Math" panose="02040503050406030204" pitchFamily="18" charset="0"/>
+                                    </a:rPr>
+                                    <m:t>𝑡</m:t>
+                                  </m:r>
+                                </m:sub>
+                              </m:sSub>
+                              <m:r>
+                                <a:rPr lang="en-US" b="0" i="1" dirty="0" smtClean="0">
+                                  <a:latin typeface="Cambria Math" panose="02040503050406030204" pitchFamily="18" charset="0"/>
+                                </a:rPr>
+                                <m:t>+(1−</m:t>
+                              </m:r>
+                              <m:r>
+                                <a:rPr lang="en-US" b="0" i="1" dirty="0" smtClean="0">
+                                  <a:latin typeface="Cambria Math" panose="02040503050406030204" pitchFamily="18" charset="0"/>
+                                  <a:ea typeface="Cambria Math" panose="02040503050406030204" pitchFamily="18" charset="0"/>
+                                </a:rPr>
+                                <m:t>𝛾</m:t>
+                              </m:r>
+                              <m:r>
+                                <a:rPr lang="en-US" b="0" i="1" dirty="0" smtClean="0">
+                                  <a:latin typeface="Cambria Math" panose="02040503050406030204" pitchFamily="18" charset="0"/>
+                                  <a:ea typeface="Cambria Math" panose="02040503050406030204" pitchFamily="18" charset="0"/>
+                                </a:rPr>
+                                <m:t>)∗</m:t>
+                              </m:r>
+                              <m:sSup>
+                                <m:sSupPr>
+                                  <m:ctrlPr>
+                                    <a:rPr lang="en-US" b="0" i="1" dirty="0" smtClean="0">
+                                      <a:latin typeface="Cambria Math" panose="02040503050406030204" pitchFamily="18" charset="0"/>
+                                      <a:ea typeface="Cambria Math" panose="02040503050406030204" pitchFamily="18" charset="0"/>
+                                    </a:rPr>
+                                  </m:ctrlPr>
+                                </m:sSupPr>
+                                <m:e>
+                                  <m:r>
+                                    <a:rPr lang="en-US" b="0" i="1" dirty="0" smtClean="0">
+                                      <a:latin typeface="Cambria Math" panose="02040503050406030204" pitchFamily="18" charset="0"/>
+                                    </a:rPr>
+                                    <m:t>𝑑𝑊</m:t>
+                                  </m:r>
+                                </m:e>
+                                <m:sup>
+                                  <m:r>
+                                    <a:rPr lang="en-US" b="0" i="1" dirty="0" smtClean="0">
+                                      <a:latin typeface="Cambria Math" panose="02040503050406030204" pitchFamily="18" charset="0"/>
+                                      <a:ea typeface="Cambria Math" panose="02040503050406030204" pitchFamily="18" charset="0"/>
+                                    </a:rPr>
+                                    <m:t>2</m:t>
+                                  </m:r>
+                                </m:sup>
+                              </m:sSup>
+                            </m:oMath>
+                          </a14:m>
+                          <a:endParaRPr lang="en-US" dirty="0"/>
+                        </a:p>
+                        <a:p>
+                          <a:pPr marL="285750" marR="0" lvl="0" indent="-285750" algn="dist" defTabSz="914400" rtl="0" eaLnBrk="1" fontAlgn="auto" latinLnBrk="0" hangingPunct="1">
+                            <a:lnSpc>
+                              <a:spcPct val="100000"/>
+                            </a:lnSpc>
+                            <a:spcBef>
+                              <a:spcPts val="0"/>
+                            </a:spcBef>
+                            <a:spcAft>
+                              <a:spcPts val="0"/>
+                            </a:spcAft>
+                            <a:buClrTx/>
+                            <a:buSzTx/>
+                            <a:buFont typeface="Arial" panose="020B0604020202020204" pitchFamily="34" charset="0"/>
+                            <a:buChar char="•"/>
+                            <a:tabLst/>
+                            <a:defRPr/>
+                          </a:pPr>
+                          <a14:m>
+                            <m:oMath xmlns:m="http://schemas.openxmlformats.org/officeDocument/2006/math">
+                              <m:sSub>
+                                <m:sSubPr>
+                                  <m:ctrlPr>
+                                    <a:rPr lang="en-US" b="0" i="1" smtClean="0">
+                                      <a:latin typeface="Cambria Math" panose="02040503050406030204" pitchFamily="18" charset="0"/>
+                                    </a:rPr>
+                                  </m:ctrlPr>
+                                </m:sSubPr>
+                                <m:e>
+                                  <m:r>
+                                    <a:rPr lang="en-US" b="0" i="1" smtClean="0">
+                                      <a:latin typeface="Cambria Math" panose="02040503050406030204" pitchFamily="18" charset="0"/>
+                                    </a:rPr>
+                                    <m:t>𝑊</m:t>
+                                  </m:r>
+                                </m:e>
+                                <m:sub>
+                                  <m:r>
+                                    <a:rPr lang="en-US" b="0" i="1" smtClean="0">
+                                      <a:latin typeface="Cambria Math" panose="02040503050406030204" pitchFamily="18" charset="0"/>
+                                    </a:rPr>
+                                    <m:t>𝑡</m:t>
+                                  </m:r>
+                                  <m:r>
+                                    <a:rPr lang="en-US" b="0" i="1" smtClean="0">
+                                      <a:latin typeface="Cambria Math" panose="02040503050406030204" pitchFamily="18" charset="0"/>
+                                    </a:rPr>
+                                    <m:t>+1</m:t>
+                                  </m:r>
+                                </m:sub>
+                              </m:sSub>
+                              <m:r>
+                                <a:rPr lang="en-US" b="0" i="1" smtClean="0">
+                                  <a:latin typeface="Cambria Math" panose="02040503050406030204" pitchFamily="18" charset="0"/>
+                                </a:rPr>
+                                <m:t>=</m:t>
+                              </m:r>
+                              <m:sSub>
+                                <m:sSubPr>
+                                  <m:ctrlPr>
+                                    <a:rPr lang="en-US" b="0" i="1" smtClean="0">
+                                      <a:latin typeface="Cambria Math" panose="02040503050406030204" pitchFamily="18" charset="0"/>
+                                    </a:rPr>
+                                  </m:ctrlPr>
+                                </m:sSubPr>
+                                <m:e>
+                                  <m:r>
+                                    <a:rPr lang="en-US" b="0" i="1" smtClean="0">
+                                      <a:latin typeface="Cambria Math" panose="02040503050406030204" pitchFamily="18" charset="0"/>
+                                    </a:rPr>
+                                    <m:t>𝑊</m:t>
+                                  </m:r>
+                                </m:e>
+                                <m:sub>
+                                  <m:r>
+                                    <a:rPr lang="en-US" b="0" i="1" smtClean="0">
+                                      <a:latin typeface="Cambria Math" panose="02040503050406030204" pitchFamily="18" charset="0"/>
+                                    </a:rPr>
+                                    <m:t>𝑡</m:t>
+                                  </m:r>
+                                </m:sub>
+                              </m:sSub>
+                              <m:r>
+                                <a:rPr lang="en-US" b="0" i="1" smtClean="0">
+                                  <a:latin typeface="Cambria Math" panose="02040503050406030204" pitchFamily="18" charset="0"/>
+                                </a:rPr>
+                                <m:t>−</m:t>
+                              </m:r>
+                              <m:r>
+                                <a:rPr lang="en-US" b="0" i="1" smtClean="0">
+                                  <a:latin typeface="Cambria Math" panose="02040503050406030204" pitchFamily="18" charset="0"/>
+                                  <a:ea typeface="Cambria Math" panose="02040503050406030204" pitchFamily="18" charset="0"/>
+                                </a:rPr>
+                                <m:t>𝛼</m:t>
+                              </m:r>
+                              <m:r>
+                                <a:rPr lang="en-US" b="0" i="1" smtClean="0">
+                                  <a:latin typeface="Cambria Math" panose="02040503050406030204" pitchFamily="18" charset="0"/>
+                                </a:rPr>
+                                <m:t>∗</m:t>
+                              </m:r>
+                              <m:f>
+                                <m:fPr>
+                                  <m:ctrlPr>
+                                    <a:rPr lang="en-US" b="0" i="1" smtClean="0">
+                                      <a:latin typeface="Cambria Math" panose="02040503050406030204" pitchFamily="18" charset="0"/>
+                                    </a:rPr>
+                                  </m:ctrlPr>
+                                </m:fPr>
+                                <m:num>
+                                  <m:r>
+                                    <a:rPr lang="en-US" b="0" i="1" smtClean="0">
+                                      <a:latin typeface="Cambria Math" panose="02040503050406030204" pitchFamily="18" charset="0"/>
+                                    </a:rPr>
+                                    <m:t>𝑑𝑊</m:t>
+                                  </m:r>
+                                </m:num>
+                                <m:den>
+                                  <m:rad>
+                                    <m:radPr>
+                                      <m:degHide m:val="on"/>
+                                      <m:ctrlPr>
+                                        <a:rPr lang="en-US" b="0" i="1" smtClean="0">
+                                          <a:latin typeface="Cambria Math" panose="02040503050406030204" pitchFamily="18" charset="0"/>
+                                        </a:rPr>
+                                      </m:ctrlPr>
+                                    </m:radPr>
+                                    <m:deg/>
+                                    <m:e>
+                                      <m:sSub>
+                                        <m:sSubPr>
+                                          <m:ctrlPr>
+                                            <a:rPr lang="en-US" b="0" i="1" smtClean="0">
+                                              <a:latin typeface="Cambria Math" panose="02040503050406030204" pitchFamily="18" charset="0"/>
+                                            </a:rPr>
+                                          </m:ctrlPr>
+                                        </m:sSubPr>
+                                        <m:e>
+                                          <m:r>
+                                            <a:rPr lang="en-US" b="0" i="1" smtClean="0">
+                                              <a:latin typeface="Cambria Math" panose="02040503050406030204" pitchFamily="18" charset="0"/>
+                                            </a:rPr>
+                                            <m:t>𝑆</m:t>
+                                          </m:r>
+                                        </m:e>
+                                        <m:sub>
+                                          <m:r>
+                                            <a:rPr lang="en-US" b="0" i="1" smtClean="0">
+                                              <a:latin typeface="Cambria Math" panose="02040503050406030204" pitchFamily="18" charset="0"/>
+                                            </a:rPr>
+                                            <m:t>𝑡</m:t>
+                                          </m:r>
+                                          <m:r>
+                                            <a:rPr lang="en-US" b="0" i="1" smtClean="0">
+                                              <a:latin typeface="Cambria Math" panose="02040503050406030204" pitchFamily="18" charset="0"/>
+                                            </a:rPr>
+                                            <m:t>+1</m:t>
+                                          </m:r>
+                                        </m:sub>
+                                      </m:sSub>
+                                      <m:r>
+                                        <a:rPr lang="en-US" b="0" i="1" smtClean="0">
+                                          <a:latin typeface="Cambria Math" panose="02040503050406030204" pitchFamily="18" charset="0"/>
+                                        </a:rPr>
+                                        <m:t>+</m:t>
+                                      </m:r>
+                                      <m:r>
+                                        <a:rPr lang="en-US" b="0" i="1" smtClean="0">
+                                          <a:latin typeface="Cambria Math" panose="02040503050406030204" pitchFamily="18" charset="0"/>
+                                          <a:ea typeface="Cambria Math" panose="02040503050406030204" pitchFamily="18" charset="0"/>
+                                        </a:rPr>
+                                        <m:t>𝜀</m:t>
+                                      </m:r>
+                                    </m:e>
+                                  </m:rad>
+                                </m:den>
+                              </m:f>
+                            </m:oMath>
+                          </a14:m>
+                          <a:endParaRPr lang="en-US" dirty="0"/>
+                        </a:p>
+                      </a:txBody>
+                      <a:tcPr/>
+                    </a:tc>
+                    <a:tc>
+                      <a:txBody>
+                        <a:bodyPr/>
+                        <a:lstStyle/>
+                        <a:p>
+                          <a:endParaRPr lang="en-US" dirty="0"/>
+                        </a:p>
+                      </a:txBody>
+                      <a:tcPr/>
+                    </a:tc>
+                    <a:extLst>
+                      <a:ext uri="{0D108BD9-81ED-4DB2-BD59-A6C34878D82A}">
+                        <a16:rowId xmlns:a16="http://schemas.microsoft.com/office/drawing/2014/main" val="2748839980"/>
+                      </a:ext>
+                    </a:extLst>
+                  </a:tr>
+                  <a:tr h="510726">
+                    <a:tc>
+                      <a:txBody>
+                        <a:bodyPr/>
+                        <a:lstStyle/>
+                        <a:p>
+                          <a:r>
+                            <a:rPr lang="en-US" dirty="0"/>
+                            <a:t>Adam</a:t>
+                          </a:r>
+                        </a:p>
+                      </a:txBody>
+                      <a:tcPr/>
+                    </a:tc>
+                    <a:tc>
+                      <a:txBody>
+                        <a:bodyPr/>
+                        <a:lstStyle/>
+                        <a:p>
+                          <a:pPr marL="285750" marR="0" lvl="0" indent="-285750" algn="dist" defTabSz="914400" rtl="0" eaLnBrk="1" fontAlgn="auto" latinLnBrk="0" hangingPunct="1">
+                            <a:lnSpc>
+                              <a:spcPct val="100000"/>
+                            </a:lnSpc>
+                            <a:spcBef>
+                              <a:spcPts val="0"/>
+                            </a:spcBef>
+                            <a:spcAft>
+                              <a:spcPts val="0"/>
+                            </a:spcAft>
+                            <a:buClrTx/>
+                            <a:buSzTx/>
+                            <a:buFont typeface="Arial" panose="020B0604020202020204" pitchFamily="34" charset="0"/>
+                            <a:buChar char="•"/>
+                            <a:tabLst/>
+                            <a:defRPr/>
+                          </a:pPr>
+                          <a14:m>
+                            <m:oMath xmlns:m="http://schemas.openxmlformats.org/officeDocument/2006/math">
+                              <m:sSub>
+                                <m:sSubPr>
+                                  <m:ctrlPr>
+                                    <a:rPr lang="en-US" b="0" i="1" smtClean="0">
+                                      <a:latin typeface="Cambria Math" panose="02040503050406030204" pitchFamily="18" charset="0"/>
+                                    </a:rPr>
+                                  </m:ctrlPr>
+                                </m:sSubPr>
+                                <m:e>
+                                  <m:r>
+                                    <a:rPr lang="en-US" b="0" i="1" smtClean="0">
+                                      <a:latin typeface="Cambria Math" panose="02040503050406030204" pitchFamily="18" charset="0"/>
+                                    </a:rPr>
+                                    <m:t>𝑉</m:t>
+                                  </m:r>
+                                </m:e>
+                                <m:sub>
+                                  <m:r>
+                                    <a:rPr lang="en-US" b="0" i="1" smtClean="0">
+                                      <a:latin typeface="Cambria Math" panose="02040503050406030204" pitchFamily="18" charset="0"/>
+                                    </a:rPr>
+                                    <m:t>𝑡</m:t>
+                                  </m:r>
+                                  <m:r>
+                                    <a:rPr lang="en-US" b="0" i="1" smtClean="0">
+                                      <a:latin typeface="Cambria Math" panose="02040503050406030204" pitchFamily="18" charset="0"/>
+                                    </a:rPr>
+                                    <m:t>+1</m:t>
+                                  </m:r>
+                                </m:sub>
+                              </m:sSub>
+                              <m:r>
+                                <a:rPr lang="en-US" b="0" i="1" dirty="0" smtClean="0">
+                                  <a:latin typeface="Cambria Math" panose="02040503050406030204" pitchFamily="18" charset="0"/>
+                                </a:rPr>
+                                <m:t>=</m:t>
+                              </m:r>
+                              <m:r>
+                                <a:rPr lang="en-US" b="0" i="1" dirty="0" smtClean="0">
+                                  <a:latin typeface="Cambria Math" panose="02040503050406030204" pitchFamily="18" charset="0"/>
+                                  <a:ea typeface="Cambria Math" panose="02040503050406030204" pitchFamily="18" charset="0"/>
+                                </a:rPr>
+                                <m:t>𝛽</m:t>
+                              </m:r>
+                              <m:r>
+                                <a:rPr lang="en-US" b="0" i="1" dirty="0" smtClean="0">
+                                  <a:latin typeface="Cambria Math" panose="02040503050406030204" pitchFamily="18" charset="0"/>
+                                  <a:ea typeface="Cambria Math" panose="02040503050406030204" pitchFamily="18" charset="0"/>
+                                </a:rPr>
+                                <m:t>∗</m:t>
+                              </m:r>
+                              <m:sSub>
+                                <m:sSubPr>
+                                  <m:ctrlPr>
+                                    <a:rPr lang="en-US" b="0" i="1" dirty="0" err="1" smtClean="0">
+                                      <a:latin typeface="Cambria Math" panose="02040503050406030204" pitchFamily="18" charset="0"/>
+                                    </a:rPr>
+                                  </m:ctrlPr>
+                                </m:sSubPr>
+                                <m:e>
+                                  <m:r>
+                                    <a:rPr lang="en-US" b="0" i="1" dirty="0" smtClean="0">
+                                      <a:latin typeface="Cambria Math" panose="02040503050406030204" pitchFamily="18" charset="0"/>
+                                    </a:rPr>
+                                    <m:t>𝑉</m:t>
+                                  </m:r>
+                                </m:e>
+                                <m:sub>
+                                  <m:r>
+                                    <a:rPr lang="en-US" b="0" i="1" dirty="0" err="1" smtClean="0">
+                                      <a:latin typeface="Cambria Math" panose="02040503050406030204" pitchFamily="18" charset="0"/>
+                                    </a:rPr>
+                                    <m:t>𝑡</m:t>
+                                  </m:r>
+                                </m:sub>
+                              </m:sSub>
+                              <m:r>
+                                <a:rPr lang="en-US" b="0" i="1" dirty="0" smtClean="0">
+                                  <a:latin typeface="Cambria Math" panose="02040503050406030204" pitchFamily="18" charset="0"/>
+                                </a:rPr>
+                                <m:t>+(1−</m:t>
+                              </m:r>
+                              <m:r>
+                                <a:rPr lang="en-US" b="0" i="1" dirty="0" smtClean="0">
+                                  <a:latin typeface="Cambria Math" panose="02040503050406030204" pitchFamily="18" charset="0"/>
+                                  <a:ea typeface="Cambria Math" panose="02040503050406030204" pitchFamily="18" charset="0"/>
+                                </a:rPr>
+                                <m:t>𝛽</m:t>
+                              </m:r>
+                              <m:r>
+                                <a:rPr lang="en-US" b="0" i="1" dirty="0" smtClean="0">
+                                  <a:latin typeface="Cambria Math" panose="02040503050406030204" pitchFamily="18" charset="0"/>
+                                  <a:ea typeface="Cambria Math" panose="02040503050406030204" pitchFamily="18" charset="0"/>
+                                </a:rPr>
+                                <m:t>)∗</m:t>
+                              </m:r>
+                              <m:r>
+                                <a:rPr lang="en-US" b="0" i="1" dirty="0" err="1" smtClean="0">
+                                  <a:latin typeface="Cambria Math" panose="02040503050406030204" pitchFamily="18" charset="0"/>
+                                </a:rPr>
+                                <m:t>𝑑𝑊</m:t>
+                              </m:r>
+                            </m:oMath>
+                          </a14:m>
+                          <a:endParaRPr lang="en-US" b="0" i="1" dirty="0">
+                            <a:latin typeface="Cambria Math" panose="02040503050406030204" pitchFamily="18" charset="0"/>
+                          </a:endParaRPr>
+                        </a:p>
+                        <a:p>
+                          <a:pPr marL="285750" marR="0" lvl="0" indent="-285750" algn="dist" defTabSz="914400" rtl="0" eaLnBrk="1" fontAlgn="auto" latinLnBrk="0" hangingPunct="1">
+                            <a:lnSpc>
+                              <a:spcPct val="100000"/>
+                            </a:lnSpc>
+                            <a:spcBef>
+                              <a:spcPts val="0"/>
+                            </a:spcBef>
+                            <a:spcAft>
+                              <a:spcPts val="0"/>
+                            </a:spcAft>
+                            <a:buClrTx/>
+                            <a:buSzTx/>
+                            <a:buFont typeface="Arial" panose="020B0604020202020204" pitchFamily="34" charset="0"/>
+                            <a:buChar char="•"/>
+                            <a:tabLst/>
+                            <a:defRPr/>
+                          </a:pPr>
+                          <a14:m>
+                            <m:oMath xmlns:m="http://schemas.openxmlformats.org/officeDocument/2006/math">
+                              <m:sSub>
+                                <m:sSubPr>
+                                  <m:ctrlPr>
+                                    <a:rPr lang="en-US" b="0" i="1" smtClean="0">
+                                      <a:latin typeface="Cambria Math" panose="02040503050406030204" pitchFamily="18" charset="0"/>
+                                    </a:rPr>
+                                  </m:ctrlPr>
+                                </m:sSubPr>
+                                <m:e>
+                                  <m:r>
+                                    <a:rPr lang="en-US" b="0" i="1" smtClean="0">
+                                      <a:latin typeface="Cambria Math" panose="02040503050406030204" pitchFamily="18" charset="0"/>
+                                    </a:rPr>
+                                    <m:t>𝑆</m:t>
+                                  </m:r>
+                                </m:e>
+                                <m:sub>
+                                  <m:r>
+                                    <a:rPr lang="en-US" b="0" i="1" smtClean="0">
+                                      <a:latin typeface="Cambria Math" panose="02040503050406030204" pitchFamily="18" charset="0"/>
+                                    </a:rPr>
+                                    <m:t>𝑡</m:t>
+                                  </m:r>
+                                  <m:r>
+                                    <a:rPr lang="en-US" b="0" i="1" smtClean="0">
+                                      <a:latin typeface="Cambria Math" panose="02040503050406030204" pitchFamily="18" charset="0"/>
+                                    </a:rPr>
+                                    <m:t>+1</m:t>
+                                  </m:r>
+                                </m:sub>
+                              </m:sSub>
+                              <m:r>
+                                <a:rPr lang="en-US" b="0" i="1" dirty="0" smtClean="0">
+                                  <a:latin typeface="Cambria Math" panose="02040503050406030204" pitchFamily="18" charset="0"/>
+                                </a:rPr>
+                                <m:t>=</m:t>
+                              </m:r>
+                              <m:r>
+                                <a:rPr lang="en-US" b="0" i="1" dirty="0" smtClean="0">
+                                  <a:latin typeface="Cambria Math" panose="02040503050406030204" pitchFamily="18" charset="0"/>
+                                  <a:ea typeface="Cambria Math" panose="02040503050406030204" pitchFamily="18" charset="0"/>
+                                </a:rPr>
+                                <m:t>𝛾</m:t>
+                              </m:r>
+                              <m:r>
+                                <a:rPr lang="en-US" b="0" i="1" dirty="0" smtClean="0">
+                                  <a:latin typeface="Cambria Math" panose="02040503050406030204" pitchFamily="18" charset="0"/>
+                                  <a:ea typeface="Cambria Math" panose="02040503050406030204" pitchFamily="18" charset="0"/>
+                                </a:rPr>
+                                <m:t>∗</m:t>
+                              </m:r>
+                              <m:sSub>
+                                <m:sSubPr>
+                                  <m:ctrlPr>
+                                    <a:rPr lang="en-US" b="0" i="1" dirty="0" err="1" smtClean="0">
+                                      <a:latin typeface="Cambria Math" panose="02040503050406030204" pitchFamily="18" charset="0"/>
+                                    </a:rPr>
+                                  </m:ctrlPr>
+                                </m:sSubPr>
+                                <m:e>
+                                  <m:r>
+                                    <a:rPr lang="en-US" b="0" i="1" dirty="0" smtClean="0">
+                                      <a:latin typeface="Cambria Math" panose="02040503050406030204" pitchFamily="18" charset="0"/>
+                                    </a:rPr>
+                                    <m:t>𝑆</m:t>
+                                  </m:r>
+                                </m:e>
+                                <m:sub>
+                                  <m:r>
+                                    <a:rPr lang="en-US" b="0" i="1" dirty="0" err="1" smtClean="0">
+                                      <a:latin typeface="Cambria Math" panose="02040503050406030204" pitchFamily="18" charset="0"/>
+                                    </a:rPr>
+                                    <m:t>𝑡</m:t>
+                                  </m:r>
+                                </m:sub>
+                              </m:sSub>
+                              <m:r>
+                                <a:rPr lang="en-US" b="0" i="1" dirty="0" smtClean="0">
+                                  <a:latin typeface="Cambria Math" panose="02040503050406030204" pitchFamily="18" charset="0"/>
+                                </a:rPr>
+                                <m:t>+(1−</m:t>
+                              </m:r>
+                              <m:r>
+                                <a:rPr lang="en-US" b="0" i="1" dirty="0" smtClean="0">
+                                  <a:latin typeface="Cambria Math" panose="02040503050406030204" pitchFamily="18" charset="0"/>
+                                  <a:ea typeface="Cambria Math" panose="02040503050406030204" pitchFamily="18" charset="0"/>
+                                </a:rPr>
+                                <m:t>𝛾</m:t>
+                              </m:r>
+                              <m:r>
+                                <a:rPr lang="en-US" b="0" i="1" dirty="0" smtClean="0">
+                                  <a:latin typeface="Cambria Math" panose="02040503050406030204" pitchFamily="18" charset="0"/>
+                                  <a:ea typeface="Cambria Math" panose="02040503050406030204" pitchFamily="18" charset="0"/>
+                                </a:rPr>
+                                <m:t>)∗</m:t>
+                              </m:r>
+                              <m:sSup>
+                                <m:sSupPr>
+                                  <m:ctrlPr>
+                                    <a:rPr lang="en-US" b="0" i="1" dirty="0" smtClean="0">
+                                      <a:latin typeface="Cambria Math" panose="02040503050406030204" pitchFamily="18" charset="0"/>
+                                      <a:ea typeface="Cambria Math" panose="02040503050406030204" pitchFamily="18" charset="0"/>
+                                    </a:rPr>
+                                  </m:ctrlPr>
+                                </m:sSupPr>
+                                <m:e>
+                                  <m:r>
+                                    <a:rPr lang="en-US" b="0" i="1" dirty="0" smtClean="0">
+                                      <a:latin typeface="Cambria Math" panose="02040503050406030204" pitchFamily="18" charset="0"/>
+                                    </a:rPr>
+                                    <m:t>𝑑𝑊</m:t>
+                                  </m:r>
+                                </m:e>
+                                <m:sup>
+                                  <m:r>
+                                    <a:rPr lang="en-US" b="0" i="1" dirty="0" smtClean="0">
+                                      <a:latin typeface="Cambria Math" panose="02040503050406030204" pitchFamily="18" charset="0"/>
+                                      <a:ea typeface="Cambria Math" panose="02040503050406030204" pitchFamily="18" charset="0"/>
+                                    </a:rPr>
+                                    <m:t>2</m:t>
+                                  </m:r>
+                                </m:sup>
+                              </m:sSup>
+                            </m:oMath>
+                          </a14:m>
+                          <a:endParaRPr lang="en-US" dirty="0"/>
+                        </a:p>
+                        <a:p>
+                          <a:pPr marL="285750" marR="0" lvl="0" indent="-285750" algn="dist" defTabSz="914400" rtl="0" eaLnBrk="1" fontAlgn="auto" latinLnBrk="0" hangingPunct="1">
+                            <a:lnSpc>
+                              <a:spcPct val="100000"/>
+                            </a:lnSpc>
+                            <a:spcBef>
+                              <a:spcPts val="0"/>
+                            </a:spcBef>
+                            <a:spcAft>
+                              <a:spcPts val="0"/>
+                            </a:spcAft>
+                            <a:buClrTx/>
+                            <a:buSzTx/>
+                            <a:buFont typeface="Arial" panose="020B0604020202020204" pitchFamily="34" charset="0"/>
+                            <a:buChar char="•"/>
+                            <a:tabLst/>
+                            <a:defRPr/>
+                          </a:pPr>
+                          <a14:m>
+                            <m:oMath xmlns:m="http://schemas.openxmlformats.org/officeDocument/2006/math">
+                              <m:sSub>
+                                <m:sSubPr>
+                                  <m:ctrlPr>
+                                    <a:rPr lang="en-US" b="0" i="1" smtClean="0">
+                                      <a:latin typeface="Cambria Math" panose="02040503050406030204" pitchFamily="18" charset="0"/>
+                                    </a:rPr>
+                                  </m:ctrlPr>
+                                </m:sSubPr>
+                                <m:e>
+                                  <m:r>
+                                    <a:rPr lang="en-US" b="0" i="1" smtClean="0">
+                                      <a:latin typeface="Cambria Math" panose="02040503050406030204" pitchFamily="18" charset="0"/>
+                                    </a:rPr>
+                                    <m:t>𝑊</m:t>
+                                  </m:r>
+                                </m:e>
+                                <m:sub>
+                                  <m:r>
+                                    <a:rPr lang="en-US" b="0" i="1" smtClean="0">
+                                      <a:latin typeface="Cambria Math" panose="02040503050406030204" pitchFamily="18" charset="0"/>
+                                    </a:rPr>
+                                    <m:t>𝑡</m:t>
+                                  </m:r>
+                                  <m:r>
+                                    <a:rPr lang="en-US" b="0" i="1" smtClean="0">
+                                      <a:latin typeface="Cambria Math" panose="02040503050406030204" pitchFamily="18" charset="0"/>
+                                    </a:rPr>
+                                    <m:t>+1</m:t>
+                                  </m:r>
+                                </m:sub>
+                              </m:sSub>
+                              <m:r>
+                                <a:rPr lang="en-US" b="0" i="1" smtClean="0">
+                                  <a:latin typeface="Cambria Math" panose="02040503050406030204" pitchFamily="18" charset="0"/>
+                                </a:rPr>
+                                <m:t>=</m:t>
+                              </m:r>
+                              <m:sSub>
+                                <m:sSubPr>
+                                  <m:ctrlPr>
+                                    <a:rPr lang="en-US" b="0" i="1" smtClean="0">
+                                      <a:latin typeface="Cambria Math" panose="02040503050406030204" pitchFamily="18" charset="0"/>
+                                    </a:rPr>
+                                  </m:ctrlPr>
+                                </m:sSubPr>
+                                <m:e>
+                                  <m:r>
+                                    <a:rPr lang="en-US" b="0" i="1" smtClean="0">
+                                      <a:latin typeface="Cambria Math" panose="02040503050406030204" pitchFamily="18" charset="0"/>
+                                    </a:rPr>
+                                    <m:t>𝑊</m:t>
+                                  </m:r>
+                                </m:e>
+                                <m:sub>
+                                  <m:r>
+                                    <a:rPr lang="en-US" b="0" i="1" smtClean="0">
+                                      <a:latin typeface="Cambria Math" panose="02040503050406030204" pitchFamily="18" charset="0"/>
+                                    </a:rPr>
+                                    <m:t>𝑡</m:t>
+                                  </m:r>
+                                </m:sub>
+                              </m:sSub>
+                              <m:r>
+                                <a:rPr lang="en-US" b="0" i="1" smtClean="0">
+                                  <a:latin typeface="Cambria Math" panose="02040503050406030204" pitchFamily="18" charset="0"/>
+                                </a:rPr>
+                                <m:t>−</m:t>
+                              </m:r>
+                              <m:r>
+                                <a:rPr lang="en-US" b="0" i="1" smtClean="0">
+                                  <a:latin typeface="Cambria Math" panose="02040503050406030204" pitchFamily="18" charset="0"/>
+                                  <a:ea typeface="Cambria Math" panose="02040503050406030204" pitchFamily="18" charset="0"/>
+                                </a:rPr>
+                                <m:t>𝛼</m:t>
+                              </m:r>
+                              <m:r>
+                                <a:rPr lang="en-US" b="0" i="1" smtClean="0">
+                                  <a:latin typeface="Cambria Math" panose="02040503050406030204" pitchFamily="18" charset="0"/>
+                                </a:rPr>
+                                <m:t>∗</m:t>
+                              </m:r>
+                              <m:f>
+                                <m:fPr>
+                                  <m:ctrlPr>
+                                    <a:rPr lang="en-US" b="0" i="1" smtClean="0">
+                                      <a:latin typeface="Cambria Math" panose="02040503050406030204" pitchFamily="18" charset="0"/>
+                                    </a:rPr>
+                                  </m:ctrlPr>
+                                </m:fPr>
+                                <m:num>
+                                  <m:sSub>
+                                    <m:sSubPr>
+                                      <m:ctrlPr>
+                                        <a:rPr lang="en-US" b="0" i="1" smtClean="0">
+                                          <a:latin typeface="Cambria Math" panose="02040503050406030204" pitchFamily="18" charset="0"/>
+                                        </a:rPr>
+                                      </m:ctrlPr>
+                                    </m:sSubPr>
+                                    <m:e>
+                                      <m:r>
+                                        <a:rPr lang="en-US" b="0" i="1" smtClean="0">
+                                          <a:latin typeface="Cambria Math" panose="02040503050406030204" pitchFamily="18" charset="0"/>
+                                        </a:rPr>
+                                        <m:t>𝑉</m:t>
+                                      </m:r>
+                                    </m:e>
+                                    <m:sub>
+                                      <m:r>
+                                        <a:rPr lang="en-US" b="0" i="1" smtClean="0">
+                                          <a:latin typeface="Cambria Math" panose="02040503050406030204" pitchFamily="18" charset="0"/>
+                                        </a:rPr>
+                                        <m:t>𝑡</m:t>
+                                      </m:r>
+                                      <m:r>
+                                        <a:rPr lang="en-US" b="0" i="1" smtClean="0">
+                                          <a:latin typeface="Cambria Math" panose="02040503050406030204" pitchFamily="18" charset="0"/>
+                                        </a:rPr>
+                                        <m:t>+1</m:t>
+                                      </m:r>
+                                    </m:sub>
+                                  </m:sSub>
+                                </m:num>
+                                <m:den>
+                                  <m:rad>
+                                    <m:radPr>
+                                      <m:degHide m:val="on"/>
+                                      <m:ctrlPr>
+                                        <a:rPr lang="en-US" b="0" i="1" smtClean="0">
+                                          <a:latin typeface="Cambria Math" panose="02040503050406030204" pitchFamily="18" charset="0"/>
+                                        </a:rPr>
+                                      </m:ctrlPr>
+                                    </m:radPr>
+                                    <m:deg/>
+                                    <m:e>
+                                      <m:sSub>
+                                        <m:sSubPr>
+                                          <m:ctrlPr>
+                                            <a:rPr lang="en-US" b="0" i="1" smtClean="0">
+                                              <a:latin typeface="Cambria Math" panose="02040503050406030204" pitchFamily="18" charset="0"/>
+                                            </a:rPr>
+                                          </m:ctrlPr>
+                                        </m:sSubPr>
+                                        <m:e>
+                                          <m:r>
+                                            <a:rPr lang="en-US" b="0" i="1" smtClean="0">
+                                              <a:latin typeface="Cambria Math" panose="02040503050406030204" pitchFamily="18" charset="0"/>
+                                            </a:rPr>
+                                            <m:t>𝑆</m:t>
+                                          </m:r>
+                                        </m:e>
+                                        <m:sub>
+                                          <m:r>
+                                            <a:rPr lang="en-US" b="0" i="1" smtClean="0">
+                                              <a:latin typeface="Cambria Math" panose="02040503050406030204" pitchFamily="18" charset="0"/>
+                                            </a:rPr>
+                                            <m:t>𝑡</m:t>
+                                          </m:r>
+                                          <m:r>
+                                            <a:rPr lang="en-US" b="0" i="1" smtClean="0">
+                                              <a:latin typeface="Cambria Math" panose="02040503050406030204" pitchFamily="18" charset="0"/>
+                                            </a:rPr>
+                                            <m:t>+1</m:t>
+                                          </m:r>
+                                        </m:sub>
+                                      </m:sSub>
+                                      <m:r>
+                                        <a:rPr lang="en-US" b="0" i="1" smtClean="0">
+                                          <a:latin typeface="Cambria Math" panose="02040503050406030204" pitchFamily="18" charset="0"/>
+                                        </a:rPr>
+                                        <m:t>+</m:t>
+                                      </m:r>
+                                      <m:r>
+                                        <a:rPr lang="en-US" b="0" i="1" smtClean="0">
+                                          <a:latin typeface="Cambria Math" panose="02040503050406030204" pitchFamily="18" charset="0"/>
+                                          <a:ea typeface="Cambria Math" panose="02040503050406030204" pitchFamily="18" charset="0"/>
+                                        </a:rPr>
+                                        <m:t>𝜀</m:t>
+                                      </m:r>
+                                    </m:e>
+                                  </m:rad>
+                                </m:den>
+                              </m:f>
+                            </m:oMath>
+                          </a14:m>
+                          <a:endParaRPr lang="en-US" dirty="0"/>
+                        </a:p>
+                      </a:txBody>
+                      <a:tcPr/>
+                    </a:tc>
+                    <a:tc>
+                      <a:txBody>
+                        <a:bodyPr/>
+                        <a:lstStyle/>
+                        <a:p>
+                          <a:endParaRPr lang="en-US" dirty="0"/>
+                        </a:p>
+                      </a:txBody>
+                      <a:tcPr/>
+                    </a:tc>
+                    <a:extLst>
+                      <a:ext uri="{0D108BD9-81ED-4DB2-BD59-A6C34878D82A}">
+                        <a16:rowId xmlns:a16="http://schemas.microsoft.com/office/drawing/2014/main" val="2333451268"/>
+                      </a:ext>
+                    </a:extLst>
+                  </a:tr>
+                </a:tbl>
+              </a:graphicData>
+            </a:graphic>
+          </p:graphicFrame>
+        </mc:Choice>
+        <mc:Fallback>
+          <p:graphicFrame>
+            <p:nvGraphicFramePr>
+              <p:cNvPr id="6" name="Table 6">
+                <a:extLst>
+                  <a:ext uri="{FF2B5EF4-FFF2-40B4-BE49-F238E27FC236}">
+                    <a16:creationId xmlns:a16="http://schemas.microsoft.com/office/drawing/2014/main" id="{A3CB9A89-6C9B-43FB-9BF1-E465A84F76E7}"/>
+                  </a:ext>
+                </a:extLst>
+              </p:cNvPr>
+              <p:cNvGraphicFramePr>
+                <a:graphicFrameLocks noGrp="1"/>
+              </p:cNvGraphicFramePr>
+              <p:nvPr>
+                <p:extLst>
+                  <p:ext uri="{D42A27DB-BD31-4B8C-83A1-F6EECF244321}">
+                    <p14:modId xmlns:p14="http://schemas.microsoft.com/office/powerpoint/2010/main" val="3393461101"/>
+                  </p:ext>
+                </p:extLst>
+              </p:nvPr>
+            </p:nvGraphicFramePr>
+            <p:xfrm>
+              <a:off x="659295" y="2186606"/>
+              <a:ext cx="10515599" cy="4124555"/>
+            </p:xfrm>
+            <a:graphic>
+              <a:graphicData uri="http://schemas.openxmlformats.org/drawingml/2006/table">
+                <a:tbl>
+                  <a:tblPr firstCol="1" bandRow="1">
+                    <a:tableStyleId>{5C22544A-7EE6-4342-B048-85BDC9FD1C3A}</a:tableStyleId>
+                  </a:tblPr>
+                  <a:tblGrid>
+                    <a:gridCol w="2217183">
+                      <a:extLst>
+                        <a:ext uri="{9D8B030D-6E8A-4147-A177-3AD203B41FA5}">
+                          <a16:colId xmlns:a16="http://schemas.microsoft.com/office/drawing/2014/main" val="3260499319"/>
+                        </a:ext>
+                      </a:extLst>
+                    </a:gridCol>
+                    <a:gridCol w="4650757">
+                      <a:extLst>
+                        <a:ext uri="{9D8B030D-6E8A-4147-A177-3AD203B41FA5}">
+                          <a16:colId xmlns:a16="http://schemas.microsoft.com/office/drawing/2014/main" val="1498540713"/>
+                        </a:ext>
+                      </a:extLst>
+                    </a:gridCol>
+                    <a:gridCol w="3647659">
+                      <a:extLst>
+                        <a:ext uri="{9D8B030D-6E8A-4147-A177-3AD203B41FA5}">
+                          <a16:colId xmlns:a16="http://schemas.microsoft.com/office/drawing/2014/main" val="2916445189"/>
+                        </a:ext>
+                      </a:extLst>
+                    </a:gridCol>
+                  </a:tblGrid>
+                  <a:tr h="951690">
+                    <a:tc>
+                      <a:txBody>
+                        <a:bodyPr/>
+                        <a:lstStyle/>
+                        <a:p>
+                          <a:r>
+                            <a:rPr lang="en-US" dirty="0"/>
+                            <a:t>Optimizer</a:t>
+                          </a:r>
+                        </a:p>
+                      </a:txBody>
+                      <a:tcPr/>
+                    </a:tc>
+                    <a:tc>
+                      <a:txBody>
+                        <a:bodyPr/>
+                        <a:lstStyle/>
+                        <a:p>
+                          <a:r>
+                            <a:rPr lang="en-US" dirty="0"/>
+                            <a:t>Description</a:t>
+                          </a:r>
+                        </a:p>
+                      </a:txBody>
+                      <a:tcPr/>
+                    </a:tc>
+                    <a:tc>
+                      <a:txBody>
+                        <a:bodyPr/>
+                        <a:lstStyle/>
+                        <a:p>
+                          <a:r>
+                            <a:rPr lang="en-US" dirty="0"/>
+                            <a:t>Result</a:t>
+                          </a:r>
+                        </a:p>
+                        <a:p>
+                          <a:pPr marL="285750" indent="-285750">
+                            <a:buFontTx/>
+                            <a:buChar char="-"/>
+                          </a:pPr>
+                          <a:r>
+                            <a:rPr lang="en-US" dirty="0" err="1"/>
+                            <a:t>MenWomanDataset</a:t>
+                          </a:r>
+                          <a:endParaRPr lang="en-US" dirty="0"/>
+                        </a:p>
+                        <a:p>
+                          <a:pPr marL="285750" indent="-285750">
+                            <a:buFontTx/>
+                            <a:buChar char="-"/>
+                          </a:pPr>
+                          <a:r>
+                            <a:rPr lang="en-US" dirty="0"/>
+                            <a:t>Dense121</a:t>
+                          </a:r>
+                        </a:p>
+                      </a:txBody>
+                      <a:tcPr/>
+                    </a:tc>
+                    <a:extLst>
+                      <a:ext uri="{0D108BD9-81ED-4DB2-BD59-A6C34878D82A}">
+                        <a16:rowId xmlns:a16="http://schemas.microsoft.com/office/drawing/2014/main" val="1504969892"/>
+                      </a:ext>
+                    </a:extLst>
+                  </a:tr>
+                  <a:tr h="612069">
+                    <a:tc>
+                      <a:txBody>
+                        <a:bodyPr/>
+                        <a:lstStyle/>
+                        <a:p>
+                          <a:r>
+                            <a:rPr lang="en-US" dirty="0"/>
+                            <a:t>SGD</a:t>
+                          </a:r>
+                        </a:p>
+                      </a:txBody>
+                      <a:tcPr/>
+                    </a:tc>
+                    <a:tc>
+                      <a:txBody>
+                        <a:bodyPr/>
+                        <a:lstStyle/>
+                        <a:p>
+                          <a:endParaRPr lang="en-US"/>
+                        </a:p>
+                      </a:txBody>
+                      <a:tcPr>
+                        <a:blipFill>
+                          <a:blip r:embed="rId2"/>
+                          <a:stretch>
+                            <a:fillRect l="-47837" t="-159406" r="-78768" b="-418812"/>
+                          </a:stretch>
+                        </a:blipFill>
+                      </a:tcPr>
+                    </a:tc>
+                    <a:tc>
+                      <a:txBody>
+                        <a:bodyPr/>
+                        <a:lstStyle/>
+                        <a:p>
+                          <a:endParaRPr lang="en-US" dirty="0"/>
+                        </a:p>
+                      </a:txBody>
+                      <a:tcPr/>
+                    </a:tc>
+                    <a:extLst>
+                      <a:ext uri="{0D108BD9-81ED-4DB2-BD59-A6C34878D82A}">
+                        <a16:rowId xmlns:a16="http://schemas.microsoft.com/office/drawing/2014/main" val="3351530658"/>
+                      </a:ext>
+                    </a:extLst>
+                  </a:tr>
+                  <a:tr h="653256">
+                    <a:tc>
+                      <a:txBody>
+                        <a:bodyPr/>
+                        <a:lstStyle/>
+                        <a:p>
+                          <a:r>
+                            <a:rPr lang="en-US" dirty="0"/>
+                            <a:t>SGD Momentum</a:t>
+                          </a:r>
+                        </a:p>
+                      </a:txBody>
+                      <a:tcPr/>
+                    </a:tc>
+                    <a:tc>
+                      <a:txBody>
+                        <a:bodyPr/>
+                        <a:lstStyle/>
+                        <a:p>
+                          <a:endParaRPr lang="en-US"/>
+                        </a:p>
+                      </a:txBody>
+                      <a:tcPr>
+                        <a:blipFill>
+                          <a:blip r:embed="rId2"/>
+                          <a:stretch>
+                            <a:fillRect l="-47837" t="-244860" r="-78768" b="-295327"/>
+                          </a:stretch>
+                        </a:blipFill>
+                      </a:tcPr>
+                    </a:tc>
+                    <a:tc>
+                      <a:txBody>
+                        <a:bodyPr/>
+                        <a:lstStyle/>
+                        <a:p>
+                          <a:endParaRPr lang="en-US" dirty="0"/>
+                        </a:p>
+                      </a:txBody>
+                      <a:tcPr/>
+                    </a:tc>
+                    <a:extLst>
+                      <a:ext uri="{0D108BD9-81ED-4DB2-BD59-A6C34878D82A}">
+                        <a16:rowId xmlns:a16="http://schemas.microsoft.com/office/drawing/2014/main" val="2401624614"/>
+                      </a:ext>
+                    </a:extLst>
+                  </a:tr>
+                  <a:tr h="819404">
+                    <a:tc>
+                      <a:txBody>
+                        <a:bodyPr/>
+                        <a:lstStyle/>
+                        <a:p>
+                          <a:r>
+                            <a:rPr lang="en-US" dirty="0" err="1"/>
+                            <a:t>RMSProp</a:t>
+                          </a:r>
+                          <a:endParaRPr lang="en-US" dirty="0"/>
+                        </a:p>
+                      </a:txBody>
+                      <a:tcPr/>
+                    </a:tc>
+                    <a:tc>
+                      <a:txBody>
+                        <a:bodyPr/>
+                        <a:lstStyle/>
+                        <a:p>
+                          <a:endParaRPr lang="en-US"/>
+                        </a:p>
+                      </a:txBody>
+                      <a:tcPr>
+                        <a:blipFill>
+                          <a:blip r:embed="rId2"/>
+                          <a:stretch>
+                            <a:fillRect l="-47837" t="-273333" r="-78768" b="-134074"/>
+                          </a:stretch>
+                        </a:blipFill>
+                      </a:tcPr>
+                    </a:tc>
+                    <a:tc>
+                      <a:txBody>
+                        <a:bodyPr/>
+                        <a:lstStyle/>
+                        <a:p>
+                          <a:endParaRPr lang="en-US" dirty="0"/>
+                        </a:p>
+                      </a:txBody>
+                      <a:tcPr/>
+                    </a:tc>
+                    <a:extLst>
+                      <a:ext uri="{0D108BD9-81ED-4DB2-BD59-A6C34878D82A}">
+                        <a16:rowId xmlns:a16="http://schemas.microsoft.com/office/drawing/2014/main" val="2748839980"/>
+                      </a:ext>
+                    </a:extLst>
+                  </a:tr>
+                  <a:tr h="1088136">
+                    <a:tc>
+                      <a:txBody>
+                        <a:bodyPr/>
+                        <a:lstStyle/>
+                        <a:p>
+                          <a:r>
+                            <a:rPr lang="en-US" dirty="0"/>
+                            <a:t>Adam</a:t>
+                          </a:r>
+                        </a:p>
+                      </a:txBody>
+                      <a:tcPr/>
+                    </a:tc>
+                    <a:tc>
+                      <a:txBody>
+                        <a:bodyPr/>
+                        <a:lstStyle/>
+                        <a:p>
+                          <a:endParaRPr lang="en-US"/>
+                        </a:p>
+                      </a:txBody>
+                      <a:tcPr>
+                        <a:blipFill>
+                          <a:blip r:embed="rId2"/>
+                          <a:stretch>
+                            <a:fillRect l="-47837" t="-281564" r="-78768" b="-1117"/>
+                          </a:stretch>
+                        </a:blipFill>
+                      </a:tcPr>
+                    </a:tc>
+                    <a:tc>
+                      <a:txBody>
+                        <a:bodyPr/>
+                        <a:lstStyle/>
+                        <a:p>
+                          <a:endParaRPr lang="en-US" dirty="0"/>
+                        </a:p>
+                      </a:txBody>
+                      <a:tcPr/>
+                    </a:tc>
+                    <a:extLst>
+                      <a:ext uri="{0D108BD9-81ED-4DB2-BD59-A6C34878D82A}">
+                        <a16:rowId xmlns:a16="http://schemas.microsoft.com/office/drawing/2014/main" val="2333451268"/>
+                      </a:ext>
+                    </a:extLst>
+                  </a:tr>
+                </a:tbl>
+              </a:graphicData>
+            </a:graphic>
+          </p:graphicFrame>
+        </mc:Fallback>
+      </mc:AlternateContent>
     </p:spTree>
     <p:extLst>
       <p:ext uri="{BB962C8B-B14F-4D97-AF65-F5344CB8AC3E}">
@@ -7506,21 +9322,6 @@
 </file>
 
 <file path=customXml/item1.xml><?xml version="1.0" encoding="utf-8"?>
-<?mso-contentType ?>
-<FormTemplates xmlns="http://schemas.microsoft.com/sharepoint/v3/contenttype/forms">
-  <Display>DocumentLibraryForm</Display>
-  <Edit>DocumentLibraryForm</Edit>
-  <New>DocumentLibraryForm</New>
-</FormTemplates>
-</file>
-
-<file path=customXml/item2.xml><?xml version="1.0" encoding="utf-8"?>
-<p:properties xmlns:p="http://schemas.microsoft.com/office/2006/metadata/properties" xmlns:xsi="http://www.w3.org/2001/XMLSchema-instance" xmlns:pc="http://schemas.microsoft.com/office/infopath/2007/PartnerControls">
-  <documentManagement/>
-</p:properties>
-</file>
-
-<file path=customXml/item3.xml><?xml version="1.0" encoding="utf-8"?>
 <ct:contentTypeSchema xmlns:ct="http://schemas.microsoft.com/office/2006/metadata/contentType" xmlns:ma="http://schemas.microsoft.com/office/2006/metadata/properties/metaAttributes" ct:_="" ma:_="" ma:contentTypeName="Document" ma:contentTypeID="0x010100CC9BB778C3ED994E9CF1DEB6485FADD8" ma:contentTypeVersion="13" ma:contentTypeDescription="Create a new document." ma:contentTypeScope="" ma:versionID="23a755765a2e15a7a45c4ef215dd2561">
   <xsd:schema xmlns:xsd="http://www.w3.org/2001/XMLSchema" xmlns:xs="http://www.w3.org/2001/XMLSchema" xmlns:p="http://schemas.microsoft.com/office/2006/metadata/properties" xmlns:ns3="f6771b06-986a-45d1-8bbc-0c4ebdddf3cc" xmlns:ns4="4437091e-0f9d-4737-ae57-4b535994870f" targetNamespace="http://schemas.microsoft.com/office/2006/metadata/properties" ma:root="true" ma:fieldsID="e14b1f6b541e2fe00d8243a17e866edb" ns3:_="" ns4:_="">
     <xsd:import namespace="f6771b06-986a-45d1-8bbc-0c4ebdddf3cc"/>
@@ -7743,10 +9544,36 @@
 </ct:contentTypeSchema>
 </file>
 
+<file path=customXml/item2.xml><?xml version="1.0" encoding="utf-8"?>
+<p:properties xmlns:p="http://schemas.microsoft.com/office/2006/metadata/properties" xmlns:xsi="http://www.w3.org/2001/XMLSchema-instance" xmlns:pc="http://schemas.microsoft.com/office/infopath/2007/PartnerControls">
+  <documentManagement/>
+</p:properties>
+</file>
+
+<file path=customXml/item3.xml><?xml version="1.0" encoding="utf-8"?>
+<?mso-contentType ?>
+<FormTemplates xmlns="http://schemas.microsoft.com/sharepoint/v3/contenttype/forms">
+  <Display>DocumentLibraryForm</Display>
+  <Edit>DocumentLibraryForm</Edit>
+  <New>DocumentLibraryForm</New>
+</FormTemplates>
+</file>
+
 <file path=customXml/itemProps1.xml><?xml version="1.0" encoding="utf-8"?>
-<ds:datastoreItem xmlns:ds="http://schemas.openxmlformats.org/officeDocument/2006/customXml" ds:itemID="{B1C738DB-F8D5-400E-A5D8-1494CFB71B4A}">
+<ds:datastoreItem xmlns:ds="http://schemas.openxmlformats.org/officeDocument/2006/customXml" ds:itemID="{65DF6A79-0FFB-46A7-8D75-DBA9A890873F}">
   <ds:schemaRefs>
-    <ds:schemaRef ds:uri="http://schemas.microsoft.com/sharepoint/v3/contenttype/forms"/>
+    <ds:schemaRef ds:uri="http://schemas.microsoft.com/office/2006/metadata/contentType"/>
+    <ds:schemaRef ds:uri="http://schemas.microsoft.com/office/2006/metadata/properties/metaAttributes"/>
+    <ds:schemaRef ds:uri="http://www.w3.org/2001/XMLSchema"/>
+    <ds:schemaRef ds:uri="http://schemas.microsoft.com/office/2006/metadata/properties"/>
+    <ds:schemaRef ds:uri="f6771b06-986a-45d1-8bbc-0c4ebdddf3cc"/>
+    <ds:schemaRef ds:uri="4437091e-0f9d-4737-ae57-4b535994870f"/>
+    <ds:schemaRef ds:uri="http://schemas.microsoft.com/office/2006/documentManagement/types"/>
+    <ds:schemaRef ds:uri="http://schemas.microsoft.com/office/infopath/2007/PartnerControls"/>
+    <ds:schemaRef ds:uri="http://schemas.openxmlformats.org/package/2006/metadata/core-properties"/>
+    <ds:schemaRef ds:uri="http://purl.org/dc/elements/1.1/"/>
+    <ds:schemaRef ds:uri="http://purl.org/dc/terms/"/>
+    <ds:schemaRef ds:uri="http://schemas.microsoft.com/internal/obd"/>
   </ds:schemaRefs>
 </ds:datastoreItem>
 </file>
@@ -7769,20 +9596,9 @@
 </file>
 
 <file path=customXml/itemProps3.xml><?xml version="1.0" encoding="utf-8"?>
-<ds:datastoreItem xmlns:ds="http://schemas.openxmlformats.org/officeDocument/2006/customXml" ds:itemID="{65DF6A79-0FFB-46A7-8D75-DBA9A890873F}">
+<ds:datastoreItem xmlns:ds="http://schemas.openxmlformats.org/officeDocument/2006/customXml" ds:itemID="{B1C738DB-F8D5-400E-A5D8-1494CFB71B4A}">
   <ds:schemaRefs>
-    <ds:schemaRef ds:uri="http://schemas.microsoft.com/office/2006/metadata/contentType"/>
-    <ds:schemaRef ds:uri="http://schemas.microsoft.com/office/2006/metadata/properties/metaAttributes"/>
-    <ds:schemaRef ds:uri="http://www.w3.org/2001/XMLSchema"/>
-    <ds:schemaRef ds:uri="http://schemas.microsoft.com/office/2006/metadata/properties"/>
-    <ds:schemaRef ds:uri="f6771b06-986a-45d1-8bbc-0c4ebdddf3cc"/>
-    <ds:schemaRef ds:uri="4437091e-0f9d-4737-ae57-4b535994870f"/>
-    <ds:schemaRef ds:uri="http://schemas.microsoft.com/office/2006/documentManagement/types"/>
-    <ds:schemaRef ds:uri="http://schemas.microsoft.com/office/infopath/2007/PartnerControls"/>
-    <ds:schemaRef ds:uri="http://schemas.openxmlformats.org/package/2006/metadata/core-properties"/>
-    <ds:schemaRef ds:uri="http://purl.org/dc/elements/1.1/"/>
-    <ds:schemaRef ds:uri="http://purl.org/dc/terms/"/>
-    <ds:schemaRef ds:uri="http://schemas.microsoft.com/internal/obd"/>
+    <ds:schemaRef ds:uri="http://schemas.microsoft.com/sharepoint/v3/contenttype/forms"/>
   </ds:schemaRefs>
 </ds:datastoreItem>
 </file>
</xml_diff>